<commit_message>
changement des 'translateX' en position:relative/absolute, reecriture de la page 'aboutmereadme'
</commit_message>
<xml_diff>
--- a/images/images.pptx
+++ b/images/images.pptx
@@ -8,8 +8,9 @@
     <p:sldId id="256" r:id="rId2"/>
     <p:sldId id="257" r:id="rId3"/>
     <p:sldId id="258" r:id="rId4"/>
-    <p:sldId id="259" r:id="rId5"/>
-    <p:sldId id="260" r:id="rId6"/>
+    <p:sldId id="261" r:id="rId5"/>
+    <p:sldId id="259" r:id="rId6"/>
+    <p:sldId id="260" r:id="rId7"/>
   </p:sldIdLst>
   <p:sldSz cx="12192000" cy="6858000"/>
   <p:notesSz cx="6858000" cy="9144000"/>
@@ -3474,6 +3475,196 @@
           </p:txBody>
         </p:sp>
       </p:grpSp>
+      <p:grpSp>
+        <p:nvGrpSpPr>
+          <p:cNvPr id="14" name="Groupe 13">
+            <a:extLst>
+              <a:ext uri="{FF2B5EF4-FFF2-40B4-BE49-F238E27FC236}">
+                <a16:creationId xmlns:a16="http://schemas.microsoft.com/office/drawing/2014/main" id="{87230C3B-4919-0249-AB07-43ECE5A6D059}"/>
+              </a:ext>
+            </a:extLst>
+          </p:cNvPr>
+          <p:cNvGrpSpPr/>
+          <p:nvPr/>
+        </p:nvGrpSpPr>
+        <p:grpSpPr>
+          <a:xfrm>
+            <a:off x="8353168" y="1635209"/>
+            <a:ext cx="2117124" cy="3010932"/>
+            <a:chOff x="8353168" y="1635209"/>
+            <a:chExt cx="2117124" cy="3010932"/>
+          </a:xfrm>
+        </p:grpSpPr>
+        <p:sp>
+          <p:nvSpPr>
+            <p:cNvPr id="13" name="Rectangle 12">
+              <a:extLst>
+                <a:ext uri="{FF2B5EF4-FFF2-40B4-BE49-F238E27FC236}">
+                  <a16:creationId xmlns:a16="http://schemas.microsoft.com/office/drawing/2014/main" id="{6C82A24B-1FF7-944E-816E-D0DD313B05C5}"/>
+                </a:ext>
+              </a:extLst>
+            </p:cNvPr>
+            <p:cNvSpPr/>
+            <p:nvPr/>
+          </p:nvSpPr>
+          <p:spPr>
+            <a:xfrm>
+              <a:off x="8505568" y="1635209"/>
+              <a:ext cx="1964724" cy="2829698"/>
+            </a:xfrm>
+            <a:prstGeom prst="rect">
+              <a:avLst/>
+            </a:prstGeom>
+            <a:solidFill>
+              <a:schemeClr val="bg1"/>
+            </a:solidFill>
+            <a:ln w="25400">
+              <a:solidFill>
+                <a:schemeClr val="tx1"/>
+              </a:solidFill>
+            </a:ln>
+          </p:spPr>
+          <p:style>
+            <a:lnRef idx="2">
+              <a:schemeClr val="accent1">
+                <a:shade val="50000"/>
+              </a:schemeClr>
+            </a:lnRef>
+            <a:fillRef idx="1">
+              <a:schemeClr val="accent1"/>
+            </a:fillRef>
+            <a:effectRef idx="0">
+              <a:schemeClr val="accent1"/>
+            </a:effectRef>
+            <a:fontRef idx="minor">
+              <a:schemeClr val="lt1"/>
+            </a:fontRef>
+          </p:style>
+          <p:txBody>
+            <a:bodyPr rtlCol="0" anchor="ctr"/>
+            <a:lstStyle/>
+            <a:p>
+              <a:pPr algn="ctr"/>
+              <a:endParaRPr lang="fr-FR" dirty="0"/>
+            </a:p>
+          </p:txBody>
+        </p:sp>
+        <p:grpSp>
+          <p:nvGrpSpPr>
+            <p:cNvPr id="12" name="Groupe 11">
+              <a:extLst>
+                <a:ext uri="{FF2B5EF4-FFF2-40B4-BE49-F238E27FC236}">
+                  <a16:creationId xmlns:a16="http://schemas.microsoft.com/office/drawing/2014/main" id="{907E405B-D60F-8D40-88F9-0F2274BCE0FF}"/>
+                </a:ext>
+              </a:extLst>
+            </p:cNvPr>
+            <p:cNvGrpSpPr/>
+            <p:nvPr/>
+          </p:nvGrpSpPr>
+          <p:grpSpPr>
+            <a:xfrm>
+              <a:off x="8353168" y="1816443"/>
+              <a:ext cx="1964724" cy="2829698"/>
+              <a:chOff x="8353168" y="1816443"/>
+              <a:chExt cx="1964724" cy="2829698"/>
+            </a:xfrm>
+          </p:grpSpPr>
+          <p:sp>
+            <p:nvSpPr>
+              <p:cNvPr id="10" name="Rectangle 9">
+                <a:extLst>
+                  <a:ext uri="{FF2B5EF4-FFF2-40B4-BE49-F238E27FC236}">
+                    <a16:creationId xmlns:a16="http://schemas.microsoft.com/office/drawing/2014/main" id="{C938E42E-1238-644D-BA24-47F56601BB15}"/>
+                  </a:ext>
+                </a:extLst>
+              </p:cNvPr>
+              <p:cNvSpPr/>
+              <p:nvPr/>
+            </p:nvSpPr>
+            <p:spPr>
+              <a:xfrm>
+                <a:off x="8353168" y="1816443"/>
+                <a:ext cx="1964724" cy="2829698"/>
+              </a:xfrm>
+              <a:prstGeom prst="rect">
+                <a:avLst/>
+              </a:prstGeom>
+              <a:solidFill>
+                <a:schemeClr val="bg1"/>
+              </a:solidFill>
+              <a:ln w="25400">
+                <a:solidFill>
+                  <a:schemeClr val="tx1"/>
+                </a:solidFill>
+              </a:ln>
+            </p:spPr>
+            <p:style>
+              <a:lnRef idx="2">
+                <a:schemeClr val="accent1">
+                  <a:shade val="50000"/>
+                </a:schemeClr>
+              </a:lnRef>
+              <a:fillRef idx="1">
+                <a:schemeClr val="accent1"/>
+              </a:fillRef>
+              <a:effectRef idx="0">
+                <a:schemeClr val="accent1"/>
+              </a:effectRef>
+              <a:fontRef idx="minor">
+                <a:schemeClr val="lt1"/>
+              </a:fontRef>
+            </p:style>
+            <p:txBody>
+              <a:bodyPr rtlCol="0" anchor="ctr"/>
+              <a:lstStyle/>
+              <a:p>
+                <a:pPr algn="ctr"/>
+                <a:endParaRPr lang="fr-FR" dirty="0"/>
+              </a:p>
+            </p:txBody>
+          </p:sp>
+          <p:sp>
+            <p:nvSpPr>
+              <p:cNvPr id="11" name="ZoneTexte 10">
+                <a:extLst>
+                  <a:ext uri="{FF2B5EF4-FFF2-40B4-BE49-F238E27FC236}">
+                    <a16:creationId xmlns:a16="http://schemas.microsoft.com/office/drawing/2014/main" id="{505725DB-1E1A-0E4F-9D17-B83463AAC2FA}"/>
+                  </a:ext>
+                </a:extLst>
+              </p:cNvPr>
+              <p:cNvSpPr txBox="1"/>
+              <p:nvPr/>
+            </p:nvSpPr>
+            <p:spPr>
+              <a:xfrm>
+                <a:off x="8477071" y="3815144"/>
+                <a:ext cx="1008418" cy="830997"/>
+              </a:xfrm>
+              <a:prstGeom prst="rect">
+                <a:avLst/>
+              </a:prstGeom>
+              <a:noFill/>
+            </p:spPr>
+            <p:txBody>
+              <a:bodyPr wrap="none" rtlCol="0">
+                <a:spAutoFit/>
+              </a:bodyPr>
+              <a:lstStyle/>
+              <a:p>
+                <a:r>
+                  <a:rPr lang="fr-FR" sz="4800" dirty="0"/>
+                  <a:t>.</a:t>
+                </a:r>
+                <a:r>
+                  <a:rPr lang="fr-FR" sz="4800" dirty="0" err="1"/>
+                  <a:t>txt</a:t>
+                </a:r>
+                <a:endParaRPr lang="fr-FR" sz="4800" dirty="0"/>
+              </a:p>
+            </p:txBody>
+          </p:sp>
+        </p:grpSp>
+      </p:grpSp>
     </p:spTree>
     <p:extLst>
       <p:ext uri="{BB962C8B-B14F-4D97-AF65-F5344CB8AC3E}">
@@ -4148,279 +4339,459 @@
           <a:chExt cx="0" cy="0"/>
         </a:xfrm>
       </p:grpSpPr>
-      <p:sp>
-        <p:nvSpPr>
-          <p:cNvPr id="5" name="Rectangle 4">
+      <p:grpSp>
+        <p:nvGrpSpPr>
+          <p:cNvPr id="34" name="Groupe 33">
             <a:extLst>
               <a:ext uri="{FF2B5EF4-FFF2-40B4-BE49-F238E27FC236}">
-                <a16:creationId xmlns:a16="http://schemas.microsoft.com/office/drawing/2014/main" id="{9943C8EA-7165-D646-8FD0-BEBDEAFB79D1}"/>
+                <a16:creationId xmlns:a16="http://schemas.microsoft.com/office/drawing/2014/main" id="{DF7658F2-4D54-E446-B09F-48FB5B83558E}"/>
               </a:ext>
             </a:extLst>
           </p:cNvPr>
-          <p:cNvSpPr/>
-          <p:nvPr/>
-        </p:nvSpPr>
-        <p:spPr>
-          <a:xfrm>
-            <a:off x="2248930" y="1359243"/>
-            <a:ext cx="7722973" cy="3978876"/>
-          </a:xfrm>
-          <a:prstGeom prst="rect">
-            <a:avLst/>
-          </a:prstGeom>
-          <a:solidFill>
-            <a:schemeClr val="bg1"/>
-          </a:solidFill>
-        </p:spPr>
-        <p:style>
-          <a:lnRef idx="2">
-            <a:schemeClr val="accent1">
-              <a:shade val="50000"/>
-            </a:schemeClr>
-          </a:lnRef>
-          <a:fillRef idx="1">
-            <a:schemeClr val="accent1"/>
-          </a:fillRef>
-          <a:effectRef idx="0">
-            <a:schemeClr val="accent1"/>
-          </a:effectRef>
-          <a:fontRef idx="minor">
-            <a:schemeClr val="lt1"/>
-          </a:fontRef>
-        </p:style>
-        <p:txBody>
-          <a:bodyPr rtlCol="0" anchor="ctr"/>
-          <a:lstStyle/>
-          <a:p>
-            <a:pPr algn="ctr"/>
-            <a:endParaRPr lang="fr-FR"/>
-          </a:p>
-        </p:txBody>
-      </p:sp>
-      <p:sp>
-        <p:nvSpPr>
-          <p:cNvPr id="6" name="Rectangle 5">
-            <a:extLst>
-              <a:ext uri="{FF2B5EF4-FFF2-40B4-BE49-F238E27FC236}">
-                <a16:creationId xmlns:a16="http://schemas.microsoft.com/office/drawing/2014/main" id="{F8291CF5-B299-CB4E-AEFE-5DE119774E7B}"/>
-              </a:ext>
-            </a:extLst>
-          </p:cNvPr>
-          <p:cNvSpPr/>
-          <p:nvPr/>
-        </p:nvSpPr>
-        <p:spPr>
-          <a:xfrm>
-            <a:off x="2248930" y="1037968"/>
-            <a:ext cx="7722972" cy="321275"/>
-          </a:xfrm>
-          <a:prstGeom prst="rect">
-            <a:avLst/>
-          </a:prstGeom>
-          <a:solidFill>
-            <a:schemeClr val="accent2"/>
-          </a:solidFill>
-        </p:spPr>
-        <p:style>
-          <a:lnRef idx="2">
-            <a:schemeClr val="accent1">
-              <a:shade val="50000"/>
-            </a:schemeClr>
-          </a:lnRef>
-          <a:fillRef idx="1">
-            <a:schemeClr val="accent1"/>
-          </a:fillRef>
-          <a:effectRef idx="0">
-            <a:schemeClr val="accent1"/>
-          </a:effectRef>
-          <a:fontRef idx="minor">
-            <a:schemeClr val="lt1"/>
-          </a:fontRef>
-        </p:style>
-        <p:txBody>
-          <a:bodyPr rtlCol="0" anchor="ctr"/>
-          <a:lstStyle/>
-          <a:p>
-            <a:pPr algn="ctr"/>
-            <a:endParaRPr lang="fr-FR"/>
-          </a:p>
-        </p:txBody>
-      </p:sp>
-      <p:sp>
-        <p:nvSpPr>
-          <p:cNvPr id="7" name="Rectangle 6">
-            <a:extLst>
-              <a:ext uri="{FF2B5EF4-FFF2-40B4-BE49-F238E27FC236}">
-                <a16:creationId xmlns:a16="http://schemas.microsoft.com/office/drawing/2014/main" id="{D5D66263-C391-6D48-B014-1E804599A45E}"/>
-              </a:ext>
-            </a:extLst>
-          </p:cNvPr>
-          <p:cNvSpPr/>
-          <p:nvPr/>
-        </p:nvSpPr>
-        <p:spPr>
-          <a:xfrm>
-            <a:off x="2323069" y="1099751"/>
-            <a:ext cx="197708" cy="197708"/>
-          </a:xfrm>
-          <a:prstGeom prst="rect">
-            <a:avLst/>
-          </a:prstGeom>
-          <a:solidFill>
-            <a:schemeClr val="bg2"/>
-          </a:solidFill>
-        </p:spPr>
-        <p:style>
-          <a:lnRef idx="2">
-            <a:schemeClr val="accent1">
-              <a:shade val="50000"/>
-            </a:schemeClr>
-          </a:lnRef>
-          <a:fillRef idx="1">
-            <a:schemeClr val="accent1"/>
-          </a:fillRef>
-          <a:effectRef idx="0">
-            <a:schemeClr val="accent1"/>
-          </a:effectRef>
-          <a:fontRef idx="minor">
-            <a:schemeClr val="lt1"/>
-          </a:fontRef>
-        </p:style>
-        <p:txBody>
-          <a:bodyPr rtlCol="0" anchor="ctr"/>
-          <a:lstStyle/>
-          <a:p>
-            <a:pPr algn="ctr"/>
-            <a:endParaRPr lang="fr-FR"/>
-          </a:p>
-        </p:txBody>
-      </p:sp>
-      <p:sp>
-        <p:nvSpPr>
-          <p:cNvPr id="8" name="Rectangle 7">
-            <a:extLst>
-              <a:ext uri="{FF2B5EF4-FFF2-40B4-BE49-F238E27FC236}">
-                <a16:creationId xmlns:a16="http://schemas.microsoft.com/office/drawing/2014/main" id="{591B4BF7-00F3-2C4F-A38D-1A486CF881CD}"/>
-              </a:ext>
-            </a:extLst>
-          </p:cNvPr>
-          <p:cNvSpPr/>
-          <p:nvPr/>
-        </p:nvSpPr>
-        <p:spPr>
-          <a:xfrm>
-            <a:off x="2619626" y="1099751"/>
-            <a:ext cx="197708" cy="197708"/>
-          </a:xfrm>
-          <a:prstGeom prst="rect">
-            <a:avLst/>
-          </a:prstGeom>
-          <a:solidFill>
-            <a:schemeClr val="bg2"/>
-          </a:solidFill>
-        </p:spPr>
-        <p:style>
-          <a:lnRef idx="2">
-            <a:schemeClr val="accent1">
-              <a:shade val="50000"/>
-            </a:schemeClr>
-          </a:lnRef>
-          <a:fillRef idx="1">
-            <a:schemeClr val="accent1"/>
-          </a:fillRef>
-          <a:effectRef idx="0">
-            <a:schemeClr val="accent1"/>
-          </a:effectRef>
-          <a:fontRef idx="minor">
-            <a:schemeClr val="lt1"/>
-          </a:fontRef>
-        </p:style>
-        <p:txBody>
-          <a:bodyPr rtlCol="0" anchor="ctr"/>
-          <a:lstStyle/>
-          <a:p>
-            <a:pPr algn="ctr"/>
-            <a:endParaRPr lang="fr-FR"/>
-          </a:p>
-        </p:txBody>
-      </p:sp>
-      <p:sp>
-        <p:nvSpPr>
-          <p:cNvPr id="9" name="Rectangle 8">
-            <a:extLst>
-              <a:ext uri="{FF2B5EF4-FFF2-40B4-BE49-F238E27FC236}">
-                <a16:creationId xmlns:a16="http://schemas.microsoft.com/office/drawing/2014/main" id="{E14F15B3-2799-8740-B106-23B7AABDF345}"/>
-              </a:ext>
-            </a:extLst>
-          </p:cNvPr>
-          <p:cNvSpPr/>
-          <p:nvPr/>
-        </p:nvSpPr>
-        <p:spPr>
-          <a:xfrm>
-            <a:off x="2916183" y="1099751"/>
-            <a:ext cx="197708" cy="197708"/>
-          </a:xfrm>
-          <a:prstGeom prst="rect">
-            <a:avLst/>
-          </a:prstGeom>
-          <a:solidFill>
-            <a:schemeClr val="bg2"/>
-          </a:solidFill>
-        </p:spPr>
-        <p:style>
-          <a:lnRef idx="2">
-            <a:schemeClr val="accent1">
-              <a:shade val="50000"/>
-            </a:schemeClr>
-          </a:lnRef>
-          <a:fillRef idx="1">
-            <a:schemeClr val="accent1"/>
-          </a:fillRef>
-          <a:effectRef idx="0">
-            <a:schemeClr val="accent1"/>
-          </a:effectRef>
-          <a:fontRef idx="minor">
-            <a:schemeClr val="lt1"/>
-          </a:fontRef>
-        </p:style>
-        <p:txBody>
-          <a:bodyPr rtlCol="0" anchor="ctr"/>
-          <a:lstStyle/>
-          <a:p>
-            <a:pPr algn="ctr"/>
-            <a:endParaRPr lang="fr-FR"/>
-          </a:p>
-        </p:txBody>
-      </p:sp>
-      <p:grpSp>
-        <p:nvGrpSpPr>
-          <p:cNvPr id="18" name="Groupe 17">
-            <a:extLst>
-              <a:ext uri="{FF2B5EF4-FFF2-40B4-BE49-F238E27FC236}">
-                <a16:creationId xmlns:a16="http://schemas.microsoft.com/office/drawing/2014/main" id="{6D155C88-EB9E-9340-B6E5-D8CD37AF5C66}"/>
-              </a:ext>
-            </a:extLst>
-          </p:cNvPr>
-          <p:cNvGrpSpPr>
-            <a:grpSpLocks noChangeAspect="1"/>
-          </p:cNvGrpSpPr>
+          <p:cNvGrpSpPr/>
           <p:nvPr/>
         </p:nvGrpSpPr>
         <p:grpSpPr>
           <a:xfrm>
-            <a:off x="2361213" y="1141399"/>
-            <a:ext cx="144000" cy="136423"/>
-            <a:chOff x="10725665" y="3175686"/>
-            <a:chExt cx="704335" cy="667265"/>
+            <a:off x="2248930" y="1037968"/>
+            <a:ext cx="7727088" cy="4300151"/>
+            <a:chOff x="2248930" y="1037968"/>
+            <a:chExt cx="7727088" cy="4300151"/>
           </a:xfrm>
         </p:grpSpPr>
+        <p:sp>
+          <p:nvSpPr>
+            <p:cNvPr id="5" name="Rectangle 4">
+              <a:extLst>
+                <a:ext uri="{FF2B5EF4-FFF2-40B4-BE49-F238E27FC236}">
+                  <a16:creationId xmlns:a16="http://schemas.microsoft.com/office/drawing/2014/main" id="{9943C8EA-7165-D646-8FD0-BEBDEAFB79D1}"/>
+                </a:ext>
+              </a:extLst>
+            </p:cNvPr>
+            <p:cNvSpPr/>
+            <p:nvPr/>
+          </p:nvSpPr>
+          <p:spPr>
+            <a:xfrm>
+              <a:off x="2248930" y="1359243"/>
+              <a:ext cx="7722973" cy="3978876"/>
+            </a:xfrm>
+            <a:prstGeom prst="rect">
+              <a:avLst/>
+            </a:prstGeom>
+            <a:solidFill>
+              <a:schemeClr val="bg1"/>
+            </a:solidFill>
+            <a:ln>
+              <a:solidFill>
+                <a:schemeClr val="tx1"/>
+              </a:solidFill>
+            </a:ln>
+          </p:spPr>
+          <p:style>
+            <a:lnRef idx="2">
+              <a:schemeClr val="accent1">
+                <a:shade val="50000"/>
+              </a:schemeClr>
+            </a:lnRef>
+            <a:fillRef idx="1">
+              <a:schemeClr val="accent1"/>
+            </a:fillRef>
+            <a:effectRef idx="0">
+              <a:schemeClr val="accent1"/>
+            </a:effectRef>
+            <a:fontRef idx="minor">
+              <a:schemeClr val="lt1"/>
+            </a:fontRef>
+          </p:style>
+          <p:txBody>
+            <a:bodyPr rtlCol="0" anchor="ctr"/>
+            <a:lstStyle/>
+            <a:p>
+              <a:pPr algn="ctr"/>
+              <a:endParaRPr lang="fr-FR"/>
+            </a:p>
+          </p:txBody>
+        </p:sp>
+        <p:sp>
+          <p:nvSpPr>
+            <p:cNvPr id="6" name="Rectangle 5">
+              <a:extLst>
+                <a:ext uri="{FF2B5EF4-FFF2-40B4-BE49-F238E27FC236}">
+                  <a16:creationId xmlns:a16="http://schemas.microsoft.com/office/drawing/2014/main" id="{F8291CF5-B299-CB4E-AEFE-5DE119774E7B}"/>
+                </a:ext>
+              </a:extLst>
+            </p:cNvPr>
+            <p:cNvSpPr/>
+            <p:nvPr/>
+          </p:nvSpPr>
+          <p:spPr>
+            <a:xfrm>
+              <a:off x="2248930" y="1037968"/>
+              <a:ext cx="7722972" cy="321275"/>
+            </a:xfrm>
+            <a:prstGeom prst="rect">
+              <a:avLst/>
+            </a:prstGeom>
+            <a:solidFill>
+              <a:schemeClr val="accent2"/>
+            </a:solidFill>
+            <a:ln>
+              <a:solidFill>
+                <a:schemeClr val="tx1"/>
+              </a:solidFill>
+            </a:ln>
+          </p:spPr>
+          <p:style>
+            <a:lnRef idx="2">
+              <a:schemeClr val="accent1">
+                <a:shade val="50000"/>
+              </a:schemeClr>
+            </a:lnRef>
+            <a:fillRef idx="1">
+              <a:schemeClr val="accent1"/>
+            </a:fillRef>
+            <a:effectRef idx="0">
+              <a:schemeClr val="accent1"/>
+            </a:effectRef>
+            <a:fontRef idx="minor">
+              <a:schemeClr val="lt1"/>
+            </a:fontRef>
+          </p:style>
+          <p:txBody>
+            <a:bodyPr rtlCol="0" anchor="ctr"/>
+            <a:lstStyle/>
+            <a:p>
+              <a:pPr algn="ctr"/>
+              <a:endParaRPr lang="fr-FR"/>
+            </a:p>
+          </p:txBody>
+        </p:sp>
+        <p:sp>
+          <p:nvSpPr>
+            <p:cNvPr id="7" name="Rectangle 6">
+              <a:extLst>
+                <a:ext uri="{FF2B5EF4-FFF2-40B4-BE49-F238E27FC236}">
+                  <a16:creationId xmlns:a16="http://schemas.microsoft.com/office/drawing/2014/main" id="{D5D66263-C391-6D48-B014-1E804599A45E}"/>
+                </a:ext>
+              </a:extLst>
+            </p:cNvPr>
+            <p:cNvSpPr/>
+            <p:nvPr/>
+          </p:nvSpPr>
+          <p:spPr>
+            <a:xfrm>
+              <a:off x="2323069" y="1099751"/>
+              <a:ext cx="197708" cy="197708"/>
+            </a:xfrm>
+            <a:prstGeom prst="rect">
+              <a:avLst/>
+            </a:prstGeom>
+            <a:solidFill>
+              <a:schemeClr val="bg2"/>
+            </a:solidFill>
+            <a:ln>
+              <a:solidFill>
+                <a:schemeClr val="tx1"/>
+              </a:solidFill>
+            </a:ln>
+          </p:spPr>
+          <p:style>
+            <a:lnRef idx="2">
+              <a:schemeClr val="accent1">
+                <a:shade val="50000"/>
+              </a:schemeClr>
+            </a:lnRef>
+            <a:fillRef idx="1">
+              <a:schemeClr val="accent1"/>
+            </a:fillRef>
+            <a:effectRef idx="0">
+              <a:schemeClr val="accent1"/>
+            </a:effectRef>
+            <a:fontRef idx="minor">
+              <a:schemeClr val="lt1"/>
+            </a:fontRef>
+          </p:style>
+          <p:txBody>
+            <a:bodyPr rtlCol="0" anchor="ctr"/>
+            <a:lstStyle/>
+            <a:p>
+              <a:pPr algn="ctr"/>
+              <a:endParaRPr lang="fr-FR"/>
+            </a:p>
+          </p:txBody>
+        </p:sp>
+        <p:sp>
+          <p:nvSpPr>
+            <p:cNvPr id="8" name="Rectangle 7">
+              <a:extLst>
+                <a:ext uri="{FF2B5EF4-FFF2-40B4-BE49-F238E27FC236}">
+                  <a16:creationId xmlns:a16="http://schemas.microsoft.com/office/drawing/2014/main" id="{591B4BF7-00F3-2C4F-A38D-1A486CF881CD}"/>
+                </a:ext>
+              </a:extLst>
+            </p:cNvPr>
+            <p:cNvSpPr/>
+            <p:nvPr/>
+          </p:nvSpPr>
+          <p:spPr>
+            <a:xfrm>
+              <a:off x="2619626" y="1099751"/>
+              <a:ext cx="197708" cy="197708"/>
+            </a:xfrm>
+            <a:prstGeom prst="rect">
+              <a:avLst/>
+            </a:prstGeom>
+            <a:solidFill>
+              <a:schemeClr val="bg2"/>
+            </a:solidFill>
+            <a:ln>
+              <a:solidFill>
+                <a:schemeClr val="tx1"/>
+              </a:solidFill>
+            </a:ln>
+          </p:spPr>
+          <p:style>
+            <a:lnRef idx="2">
+              <a:schemeClr val="accent1">
+                <a:shade val="50000"/>
+              </a:schemeClr>
+            </a:lnRef>
+            <a:fillRef idx="1">
+              <a:schemeClr val="accent1"/>
+            </a:fillRef>
+            <a:effectRef idx="0">
+              <a:schemeClr val="accent1"/>
+            </a:effectRef>
+            <a:fontRef idx="minor">
+              <a:schemeClr val="lt1"/>
+            </a:fontRef>
+          </p:style>
+          <p:txBody>
+            <a:bodyPr rtlCol="0" anchor="ctr"/>
+            <a:lstStyle/>
+            <a:p>
+              <a:pPr algn="ctr"/>
+              <a:endParaRPr lang="fr-FR"/>
+            </a:p>
+          </p:txBody>
+        </p:sp>
+        <p:sp>
+          <p:nvSpPr>
+            <p:cNvPr id="9" name="Rectangle 8">
+              <a:extLst>
+                <a:ext uri="{FF2B5EF4-FFF2-40B4-BE49-F238E27FC236}">
+                  <a16:creationId xmlns:a16="http://schemas.microsoft.com/office/drawing/2014/main" id="{E14F15B3-2799-8740-B106-23B7AABDF345}"/>
+                </a:ext>
+              </a:extLst>
+            </p:cNvPr>
+            <p:cNvSpPr/>
+            <p:nvPr/>
+          </p:nvSpPr>
+          <p:spPr>
+            <a:xfrm>
+              <a:off x="2916183" y="1099751"/>
+              <a:ext cx="197708" cy="197708"/>
+            </a:xfrm>
+            <a:prstGeom prst="rect">
+              <a:avLst/>
+            </a:prstGeom>
+            <a:solidFill>
+              <a:schemeClr val="bg2"/>
+            </a:solidFill>
+            <a:ln>
+              <a:solidFill>
+                <a:schemeClr val="tx1"/>
+              </a:solidFill>
+            </a:ln>
+          </p:spPr>
+          <p:style>
+            <a:lnRef idx="2">
+              <a:schemeClr val="accent1">
+                <a:shade val="50000"/>
+              </a:schemeClr>
+            </a:lnRef>
+            <a:fillRef idx="1">
+              <a:schemeClr val="accent1"/>
+            </a:fillRef>
+            <a:effectRef idx="0">
+              <a:schemeClr val="accent1"/>
+            </a:effectRef>
+            <a:fontRef idx="minor">
+              <a:schemeClr val="lt1"/>
+            </a:fontRef>
+          </p:style>
+          <p:txBody>
+            <a:bodyPr rtlCol="0" anchor="ctr"/>
+            <a:lstStyle/>
+            <a:p>
+              <a:pPr algn="ctr"/>
+              <a:endParaRPr lang="fr-FR"/>
+            </a:p>
+          </p:txBody>
+        </p:sp>
+        <p:grpSp>
+          <p:nvGrpSpPr>
+            <p:cNvPr id="18" name="Groupe 17">
+              <a:extLst>
+                <a:ext uri="{FF2B5EF4-FFF2-40B4-BE49-F238E27FC236}">
+                  <a16:creationId xmlns:a16="http://schemas.microsoft.com/office/drawing/2014/main" id="{6D155C88-EB9E-9340-B6E5-D8CD37AF5C66}"/>
+                </a:ext>
+              </a:extLst>
+            </p:cNvPr>
+            <p:cNvGrpSpPr>
+              <a:grpSpLocks noChangeAspect="1"/>
+            </p:cNvGrpSpPr>
+            <p:nvPr/>
+          </p:nvGrpSpPr>
+          <p:grpSpPr>
+            <a:xfrm>
+              <a:off x="2348856" y="1141399"/>
+              <a:ext cx="144000" cy="136423"/>
+              <a:chOff x="10725665" y="3175686"/>
+              <a:chExt cx="704335" cy="667265"/>
+            </a:xfrm>
+          </p:grpSpPr>
+          <p:cxnSp>
+            <p:nvCxnSpPr>
+              <p:cNvPr id="11" name="Connecteur droit 10">
+                <a:extLst>
+                  <a:ext uri="{FF2B5EF4-FFF2-40B4-BE49-F238E27FC236}">
+                    <a16:creationId xmlns:a16="http://schemas.microsoft.com/office/drawing/2014/main" id="{FA46467D-3455-904C-9716-8C86570F3486}"/>
+                  </a:ext>
+                </a:extLst>
+              </p:cNvPr>
+              <p:cNvCxnSpPr/>
+              <p:nvPr/>
+            </p:nvCxnSpPr>
+            <p:spPr>
+              <a:xfrm>
+                <a:off x="10725665" y="3175686"/>
+                <a:ext cx="704335" cy="667265"/>
+              </a:xfrm>
+              <a:prstGeom prst="line">
+                <a:avLst/>
+              </a:prstGeom>
+              <a:ln>
+                <a:solidFill>
+                  <a:schemeClr val="tx1"/>
+                </a:solidFill>
+              </a:ln>
+            </p:spPr>
+            <p:style>
+              <a:lnRef idx="1">
+                <a:schemeClr val="accent1"/>
+              </a:lnRef>
+              <a:fillRef idx="0">
+                <a:schemeClr val="accent1"/>
+              </a:fillRef>
+              <a:effectRef idx="0">
+                <a:schemeClr val="accent1"/>
+              </a:effectRef>
+              <a:fontRef idx="minor">
+                <a:schemeClr val="tx1"/>
+              </a:fontRef>
+            </p:style>
+          </p:cxnSp>
+          <p:cxnSp>
+            <p:nvCxnSpPr>
+              <p:cNvPr id="16" name="Connecteur droit 15">
+                <a:extLst>
+                  <a:ext uri="{FF2B5EF4-FFF2-40B4-BE49-F238E27FC236}">
+                    <a16:creationId xmlns:a16="http://schemas.microsoft.com/office/drawing/2014/main" id="{E5E8E65C-CF2B-C442-98AF-4A66C330A88D}"/>
+                  </a:ext>
+                </a:extLst>
+              </p:cNvPr>
+              <p:cNvCxnSpPr/>
+              <p:nvPr/>
+            </p:nvCxnSpPr>
+            <p:spPr>
+              <a:xfrm flipH="1">
+                <a:off x="10725665" y="3175686"/>
+                <a:ext cx="704335" cy="667265"/>
+              </a:xfrm>
+              <a:prstGeom prst="line">
+                <a:avLst/>
+              </a:prstGeom>
+              <a:ln>
+                <a:solidFill>
+                  <a:schemeClr val="tx1"/>
+                </a:solidFill>
+              </a:ln>
+            </p:spPr>
+            <p:style>
+              <a:lnRef idx="1">
+                <a:schemeClr val="accent1"/>
+              </a:lnRef>
+              <a:fillRef idx="0">
+                <a:schemeClr val="accent1"/>
+              </a:fillRef>
+              <a:effectRef idx="0">
+                <a:schemeClr val="accent1"/>
+              </a:effectRef>
+              <a:fontRef idx="minor">
+                <a:schemeClr val="tx1"/>
+              </a:fontRef>
+            </p:style>
+          </p:cxnSp>
+        </p:grpSp>
+        <p:sp>
+          <p:nvSpPr>
+            <p:cNvPr id="19" name="Rectangle 18">
+              <a:extLst>
+                <a:ext uri="{FF2B5EF4-FFF2-40B4-BE49-F238E27FC236}">
+                  <a16:creationId xmlns:a16="http://schemas.microsoft.com/office/drawing/2014/main" id="{BE6DABA1-2E52-6340-A704-2620005F3212}"/>
+                </a:ext>
+              </a:extLst>
+            </p:cNvPr>
+            <p:cNvSpPr/>
+            <p:nvPr/>
+          </p:nvSpPr>
+          <p:spPr>
+            <a:xfrm>
+              <a:off x="2656689" y="1136826"/>
+              <a:ext cx="123568" cy="111210"/>
+            </a:xfrm>
+            <a:prstGeom prst="rect">
+              <a:avLst/>
+            </a:prstGeom>
+            <a:noFill/>
+            <a:ln>
+              <a:solidFill>
+                <a:schemeClr val="tx1"/>
+              </a:solidFill>
+            </a:ln>
+          </p:spPr>
+          <p:style>
+            <a:lnRef idx="2">
+              <a:schemeClr val="accent1">
+                <a:shade val="50000"/>
+              </a:schemeClr>
+            </a:lnRef>
+            <a:fillRef idx="1">
+              <a:schemeClr val="accent1"/>
+            </a:fillRef>
+            <a:effectRef idx="0">
+              <a:schemeClr val="accent1"/>
+            </a:effectRef>
+            <a:fontRef idx="minor">
+              <a:schemeClr val="lt1"/>
+            </a:fontRef>
+          </p:style>
+          <p:txBody>
+            <a:bodyPr rtlCol="0" anchor="ctr"/>
+            <a:lstStyle/>
+            <a:p>
+              <a:pPr algn="ctr"/>
+              <a:endParaRPr lang="fr-FR"/>
+            </a:p>
+          </p:txBody>
+        </p:sp>
         <p:cxnSp>
           <p:nvCxnSpPr>
-            <p:cNvPr id="11" name="Connecteur droit 10">
+            <p:cNvPr id="21" name="Connecteur droit 20">
               <a:extLst>
                 <a:ext uri="{FF2B5EF4-FFF2-40B4-BE49-F238E27FC236}">
-                  <a16:creationId xmlns:a16="http://schemas.microsoft.com/office/drawing/2014/main" id="{FA46467D-3455-904C-9716-8C86570F3486}"/>
+                  <a16:creationId xmlns:a16="http://schemas.microsoft.com/office/drawing/2014/main" id="{35957505-EC89-484E-8252-FEF75A0DD2C8}"/>
                 </a:ext>
               </a:extLst>
             </p:cNvPr>
@@ -4429,8 +4800,8 @@
           </p:nvCxnSpPr>
           <p:spPr>
             <a:xfrm>
-              <a:off x="10725665" y="3175686"/>
-              <a:ext cx="704335" cy="667265"/>
+              <a:off x="2940900" y="1223325"/>
+              <a:ext cx="144000" cy="0"/>
             </a:xfrm>
             <a:prstGeom prst="line">
               <a:avLst/>
@@ -4456,12 +4827,66 @@
             </a:fontRef>
           </p:style>
         </p:cxnSp>
+        <p:sp>
+          <p:nvSpPr>
+            <p:cNvPr id="22" name="Rectangle 21">
+              <a:extLst>
+                <a:ext uri="{FF2B5EF4-FFF2-40B4-BE49-F238E27FC236}">
+                  <a16:creationId xmlns:a16="http://schemas.microsoft.com/office/drawing/2014/main" id="{BE05085D-F943-F740-954E-7D41326E5894}"/>
+                </a:ext>
+              </a:extLst>
+            </p:cNvPr>
+            <p:cNvSpPr/>
+            <p:nvPr/>
+          </p:nvSpPr>
+          <p:spPr>
+            <a:xfrm>
+              <a:off x="2253046" y="1346431"/>
+              <a:ext cx="7722972" cy="321275"/>
+            </a:xfrm>
+            <a:prstGeom prst="rect">
+              <a:avLst/>
+            </a:prstGeom>
+            <a:solidFill>
+              <a:schemeClr val="bg2"/>
+            </a:solidFill>
+            <a:ln>
+              <a:solidFill>
+                <a:schemeClr val="tx1"/>
+              </a:solidFill>
+            </a:ln>
+          </p:spPr>
+          <p:style>
+            <a:lnRef idx="2">
+              <a:schemeClr val="accent1">
+                <a:shade val="50000"/>
+              </a:schemeClr>
+            </a:lnRef>
+            <a:fillRef idx="1">
+              <a:schemeClr val="accent1"/>
+            </a:fillRef>
+            <a:effectRef idx="0">
+              <a:schemeClr val="accent1"/>
+            </a:effectRef>
+            <a:fontRef idx="minor">
+              <a:schemeClr val="lt1"/>
+            </a:fontRef>
+          </p:style>
+          <p:txBody>
+            <a:bodyPr rtlCol="0" anchor="ctr"/>
+            <a:lstStyle/>
+            <a:p>
+              <a:pPr algn="ctr"/>
+              <a:endParaRPr lang="fr-FR" dirty="0"/>
+            </a:p>
+          </p:txBody>
+        </p:sp>
         <p:cxnSp>
           <p:nvCxnSpPr>
-            <p:cNvPr id="16" name="Connecteur droit 15">
+            <p:cNvPr id="24" name="Connecteur droit avec flèche 23">
               <a:extLst>
                 <a:ext uri="{FF2B5EF4-FFF2-40B4-BE49-F238E27FC236}">
-                  <a16:creationId xmlns:a16="http://schemas.microsoft.com/office/drawing/2014/main" id="{E5E8E65C-CF2B-C442-98AF-4A66C330A88D}"/>
+                  <a16:creationId xmlns:a16="http://schemas.microsoft.com/office/drawing/2014/main" id="{8A22B17B-A670-CE41-8B1D-E941A29C266B}"/>
                 </a:ext>
               </a:extLst>
             </p:cNvPr>
@@ -4470,12 +4895,105 @@
           </p:nvCxnSpPr>
           <p:spPr>
             <a:xfrm flipH="1">
-              <a:off x="10725665" y="3175686"/>
-              <a:ext cx="704335" cy="667265"/>
+              <a:off x="2373880" y="1519883"/>
+              <a:ext cx="144000" cy="0"/>
             </a:xfrm>
-            <a:prstGeom prst="line">
+            <a:prstGeom prst="straightConnector1">
               <a:avLst/>
             </a:prstGeom>
+            <a:ln w="25400">
+              <a:solidFill>
+                <a:schemeClr val="bg1">
+                  <a:lumMod val="65000"/>
+                </a:schemeClr>
+              </a:solidFill>
+              <a:headEnd type="none"/>
+              <a:tailEnd type="arrow"/>
+            </a:ln>
+          </p:spPr>
+          <p:style>
+            <a:lnRef idx="1">
+              <a:schemeClr val="accent1"/>
+            </a:lnRef>
+            <a:fillRef idx="0">
+              <a:schemeClr val="accent1"/>
+            </a:fillRef>
+            <a:effectRef idx="0">
+              <a:schemeClr val="accent1"/>
+            </a:effectRef>
+            <a:fontRef idx="minor">
+              <a:schemeClr val="tx1"/>
+            </a:fontRef>
+          </p:style>
+        </p:cxnSp>
+        <p:cxnSp>
+          <p:nvCxnSpPr>
+            <p:cNvPr id="26" name="Connecteur droit avec flèche 25">
+              <a:extLst>
+                <a:ext uri="{FF2B5EF4-FFF2-40B4-BE49-F238E27FC236}">
+                  <a16:creationId xmlns:a16="http://schemas.microsoft.com/office/drawing/2014/main" id="{425A231C-EEA0-FC46-BBEF-3EC0393D3AEA}"/>
+                </a:ext>
+              </a:extLst>
+            </p:cNvPr>
+            <p:cNvCxnSpPr/>
+            <p:nvPr/>
+          </p:nvCxnSpPr>
+          <p:spPr>
+            <a:xfrm flipH="1">
+              <a:off x="2678677" y="1519884"/>
+              <a:ext cx="144000" cy="0"/>
+            </a:xfrm>
+            <a:prstGeom prst="straightConnector1">
+              <a:avLst/>
+            </a:prstGeom>
+            <a:ln w="25400">
+              <a:solidFill>
+                <a:schemeClr val="bg1">
+                  <a:lumMod val="65000"/>
+                </a:schemeClr>
+              </a:solidFill>
+              <a:headEnd type="arrow"/>
+              <a:tailEnd type="none"/>
+            </a:ln>
+          </p:spPr>
+          <p:style>
+            <a:lnRef idx="1">
+              <a:schemeClr val="accent1"/>
+            </a:lnRef>
+            <a:fillRef idx="0">
+              <a:schemeClr val="accent1"/>
+            </a:fillRef>
+            <a:effectRef idx="0">
+              <a:schemeClr val="accent1"/>
+            </a:effectRef>
+            <a:fontRef idx="minor">
+              <a:schemeClr val="tx1"/>
+            </a:fontRef>
+          </p:style>
+        </p:cxnSp>
+        <p:sp>
+          <p:nvSpPr>
+            <p:cNvPr id="27" name="Rectangle 26">
+              <a:extLst>
+                <a:ext uri="{FF2B5EF4-FFF2-40B4-BE49-F238E27FC236}">
+                  <a16:creationId xmlns:a16="http://schemas.microsoft.com/office/drawing/2014/main" id="{E3A59578-F4B5-2744-842D-32E86C42260F}"/>
+                </a:ext>
+              </a:extLst>
+            </p:cNvPr>
+            <p:cNvSpPr/>
+            <p:nvPr/>
+          </p:nvSpPr>
+          <p:spPr>
+            <a:xfrm>
+              <a:off x="2947313" y="1397233"/>
+              <a:ext cx="6660000" cy="216000"/>
+            </a:xfrm>
+            <a:prstGeom prst="rect">
+              <a:avLst/>
+            </a:prstGeom>
+            <a:solidFill>
+              <a:schemeClr val="bg1"/>
+            </a:solidFill>
             <a:ln>
               <a:solidFill>
                 <a:schemeClr val="tx1"/>
@@ -4483,319 +5001,105 @@
             </a:ln>
           </p:spPr>
           <p:style>
-            <a:lnRef idx="1">
-              <a:schemeClr val="accent1"/>
+            <a:lnRef idx="2">
+              <a:schemeClr val="accent1">
+                <a:shade val="50000"/>
+              </a:schemeClr>
             </a:lnRef>
-            <a:fillRef idx="0">
+            <a:fillRef idx="1">
               <a:schemeClr val="accent1"/>
             </a:fillRef>
             <a:effectRef idx="0">
               <a:schemeClr val="accent1"/>
             </a:effectRef>
             <a:fontRef idx="minor">
-              <a:schemeClr val="tx1"/>
+              <a:schemeClr val="lt1"/>
             </a:fontRef>
           </p:style>
-        </p:cxnSp>
+          <p:txBody>
+            <a:bodyPr rtlCol="0" anchor="ctr"/>
+            <a:lstStyle/>
+            <a:p>
+              <a:r>
+                <a:rPr lang="fr-FR" sz="1600" b="1" dirty="0">
+                  <a:solidFill>
+                    <a:schemeClr val="tx1"/>
+                  </a:solidFill>
+                </a:rPr>
+                <a:t>/Maxence-</a:t>
+              </a:r>
+              <a:r>
+                <a:rPr lang="fr-FR" sz="1600" b="1" dirty="0" err="1">
+                  <a:solidFill>
+                    <a:schemeClr val="tx1"/>
+                  </a:solidFill>
+                </a:rPr>
+                <a:t>Macia</a:t>
+              </a:r>
+              <a:r>
+                <a:rPr lang="fr-FR" sz="1600" b="1" dirty="0">
+                  <a:solidFill>
+                    <a:schemeClr val="tx1"/>
+                  </a:solidFill>
+                </a:rPr>
+                <a:t>/Desktop/About-me</a:t>
+              </a:r>
+            </a:p>
+          </p:txBody>
+        </p:sp>
+        <p:sp>
+          <p:nvSpPr>
+            <p:cNvPr id="30" name="Rectangle 29">
+              <a:extLst>
+                <a:ext uri="{FF2B5EF4-FFF2-40B4-BE49-F238E27FC236}">
+                  <a16:creationId xmlns:a16="http://schemas.microsoft.com/office/drawing/2014/main" id="{08335D03-B13B-C14D-8F75-CB7A1CFE38AB}"/>
+                </a:ext>
+              </a:extLst>
+            </p:cNvPr>
+            <p:cNvSpPr/>
+            <p:nvPr/>
+          </p:nvSpPr>
+          <p:spPr>
+            <a:xfrm>
+              <a:off x="2248930" y="1037968"/>
+              <a:ext cx="7722972" cy="4300151"/>
+            </a:xfrm>
+            <a:prstGeom prst="rect">
+              <a:avLst/>
+            </a:prstGeom>
+            <a:noFill/>
+            <a:ln w="25400">
+              <a:solidFill>
+                <a:schemeClr val="tx1"/>
+              </a:solidFill>
+            </a:ln>
+          </p:spPr>
+          <p:style>
+            <a:lnRef idx="2">
+              <a:schemeClr val="accent1">
+                <a:shade val="50000"/>
+              </a:schemeClr>
+            </a:lnRef>
+            <a:fillRef idx="1">
+              <a:schemeClr val="accent1"/>
+            </a:fillRef>
+            <a:effectRef idx="0">
+              <a:schemeClr val="accent1"/>
+            </a:effectRef>
+            <a:fontRef idx="minor">
+              <a:schemeClr val="lt1"/>
+            </a:fontRef>
+          </p:style>
+          <p:txBody>
+            <a:bodyPr rtlCol="0" anchor="ctr"/>
+            <a:lstStyle/>
+            <a:p>
+              <a:pPr algn="ctr"/>
+              <a:endParaRPr lang="fr-FR"/>
+            </a:p>
+          </p:txBody>
+        </p:sp>
       </p:grpSp>
-      <p:sp>
-        <p:nvSpPr>
-          <p:cNvPr id="19" name="Rectangle 18">
-            <a:extLst>
-              <a:ext uri="{FF2B5EF4-FFF2-40B4-BE49-F238E27FC236}">
-                <a16:creationId xmlns:a16="http://schemas.microsoft.com/office/drawing/2014/main" id="{BE6DABA1-2E52-6340-A704-2620005F3212}"/>
-              </a:ext>
-            </a:extLst>
-          </p:cNvPr>
-          <p:cNvSpPr/>
-          <p:nvPr/>
-        </p:nvSpPr>
-        <p:spPr>
-          <a:xfrm>
-            <a:off x="2656689" y="1136826"/>
-            <a:ext cx="123568" cy="111210"/>
-          </a:xfrm>
-          <a:prstGeom prst="rect">
-            <a:avLst/>
-          </a:prstGeom>
-          <a:noFill/>
-        </p:spPr>
-        <p:style>
-          <a:lnRef idx="2">
-            <a:schemeClr val="accent1">
-              <a:shade val="50000"/>
-            </a:schemeClr>
-          </a:lnRef>
-          <a:fillRef idx="1">
-            <a:schemeClr val="accent1"/>
-          </a:fillRef>
-          <a:effectRef idx="0">
-            <a:schemeClr val="accent1"/>
-          </a:effectRef>
-          <a:fontRef idx="minor">
-            <a:schemeClr val="lt1"/>
-          </a:fontRef>
-        </p:style>
-        <p:txBody>
-          <a:bodyPr rtlCol="0" anchor="ctr"/>
-          <a:lstStyle/>
-          <a:p>
-            <a:pPr algn="ctr"/>
-            <a:endParaRPr lang="fr-FR"/>
-          </a:p>
-        </p:txBody>
-      </p:sp>
-      <p:cxnSp>
-        <p:nvCxnSpPr>
-          <p:cNvPr id="21" name="Connecteur droit 20">
-            <a:extLst>
-              <a:ext uri="{FF2B5EF4-FFF2-40B4-BE49-F238E27FC236}">
-                <a16:creationId xmlns:a16="http://schemas.microsoft.com/office/drawing/2014/main" id="{35957505-EC89-484E-8252-FEF75A0DD2C8}"/>
-              </a:ext>
-            </a:extLst>
-          </p:cNvPr>
-          <p:cNvCxnSpPr/>
-          <p:nvPr/>
-        </p:nvCxnSpPr>
-        <p:spPr>
-          <a:xfrm>
-            <a:off x="2940900" y="1223325"/>
-            <a:ext cx="144000" cy="0"/>
-          </a:xfrm>
-          <a:prstGeom prst="line">
-            <a:avLst/>
-          </a:prstGeom>
-          <a:ln>
-            <a:solidFill>
-              <a:schemeClr val="tx1"/>
-            </a:solidFill>
-          </a:ln>
-        </p:spPr>
-        <p:style>
-          <a:lnRef idx="1">
-            <a:schemeClr val="accent1"/>
-          </a:lnRef>
-          <a:fillRef idx="0">
-            <a:schemeClr val="accent1"/>
-          </a:fillRef>
-          <a:effectRef idx="0">
-            <a:schemeClr val="accent1"/>
-          </a:effectRef>
-          <a:fontRef idx="minor">
-            <a:schemeClr val="tx1"/>
-          </a:fontRef>
-        </p:style>
-      </p:cxnSp>
-      <p:sp>
-        <p:nvSpPr>
-          <p:cNvPr id="22" name="Rectangle 21">
-            <a:extLst>
-              <a:ext uri="{FF2B5EF4-FFF2-40B4-BE49-F238E27FC236}">
-                <a16:creationId xmlns:a16="http://schemas.microsoft.com/office/drawing/2014/main" id="{BE05085D-F943-F740-954E-7D41326E5894}"/>
-              </a:ext>
-            </a:extLst>
-          </p:cNvPr>
-          <p:cNvSpPr/>
-          <p:nvPr/>
-        </p:nvSpPr>
-        <p:spPr>
-          <a:xfrm>
-            <a:off x="2253046" y="1346431"/>
-            <a:ext cx="7722972" cy="321275"/>
-          </a:xfrm>
-          <a:prstGeom prst="rect">
-            <a:avLst/>
-          </a:prstGeom>
-          <a:solidFill>
-            <a:schemeClr val="bg2"/>
-          </a:solidFill>
-        </p:spPr>
-        <p:style>
-          <a:lnRef idx="2">
-            <a:schemeClr val="accent1">
-              <a:shade val="50000"/>
-            </a:schemeClr>
-          </a:lnRef>
-          <a:fillRef idx="1">
-            <a:schemeClr val="accent1"/>
-          </a:fillRef>
-          <a:effectRef idx="0">
-            <a:schemeClr val="accent1"/>
-          </a:effectRef>
-          <a:fontRef idx="minor">
-            <a:schemeClr val="lt1"/>
-          </a:fontRef>
-        </p:style>
-        <p:txBody>
-          <a:bodyPr rtlCol="0" anchor="ctr"/>
-          <a:lstStyle/>
-          <a:p>
-            <a:pPr algn="ctr"/>
-            <a:endParaRPr lang="fr-FR" dirty="0"/>
-          </a:p>
-        </p:txBody>
-      </p:sp>
-      <p:cxnSp>
-        <p:nvCxnSpPr>
-          <p:cNvPr id="24" name="Connecteur droit avec flèche 23">
-            <a:extLst>
-              <a:ext uri="{FF2B5EF4-FFF2-40B4-BE49-F238E27FC236}">
-                <a16:creationId xmlns:a16="http://schemas.microsoft.com/office/drawing/2014/main" id="{8A22B17B-A670-CE41-8B1D-E941A29C266B}"/>
-              </a:ext>
-            </a:extLst>
-          </p:cNvPr>
-          <p:cNvCxnSpPr/>
-          <p:nvPr/>
-        </p:nvCxnSpPr>
-        <p:spPr>
-          <a:xfrm flipH="1">
-            <a:off x="2373880" y="1519883"/>
-            <a:ext cx="144000" cy="0"/>
-          </a:xfrm>
-          <a:prstGeom prst="straightConnector1">
-            <a:avLst/>
-          </a:prstGeom>
-          <a:ln w="25400">
-            <a:solidFill>
-              <a:schemeClr val="bg2">
-                <a:lumMod val="75000"/>
-              </a:schemeClr>
-            </a:solidFill>
-            <a:headEnd type="none"/>
-            <a:tailEnd type="arrow"/>
-          </a:ln>
-        </p:spPr>
-        <p:style>
-          <a:lnRef idx="1">
-            <a:schemeClr val="accent1"/>
-          </a:lnRef>
-          <a:fillRef idx="0">
-            <a:schemeClr val="accent1"/>
-          </a:fillRef>
-          <a:effectRef idx="0">
-            <a:schemeClr val="accent1"/>
-          </a:effectRef>
-          <a:fontRef idx="minor">
-            <a:schemeClr val="tx1"/>
-          </a:fontRef>
-        </p:style>
-      </p:cxnSp>
-      <p:cxnSp>
-        <p:nvCxnSpPr>
-          <p:cNvPr id="26" name="Connecteur droit avec flèche 25">
-            <a:extLst>
-              <a:ext uri="{FF2B5EF4-FFF2-40B4-BE49-F238E27FC236}">
-                <a16:creationId xmlns:a16="http://schemas.microsoft.com/office/drawing/2014/main" id="{425A231C-EEA0-FC46-BBEF-3EC0393D3AEA}"/>
-              </a:ext>
-            </a:extLst>
-          </p:cNvPr>
-          <p:cNvCxnSpPr/>
-          <p:nvPr/>
-        </p:nvCxnSpPr>
-        <p:spPr>
-          <a:xfrm flipH="1">
-            <a:off x="2678677" y="1519884"/>
-            <a:ext cx="144000" cy="0"/>
-          </a:xfrm>
-          <a:prstGeom prst="straightConnector1">
-            <a:avLst/>
-          </a:prstGeom>
-          <a:ln w="25400">
-            <a:solidFill>
-              <a:schemeClr val="bg2">
-                <a:lumMod val="75000"/>
-              </a:schemeClr>
-            </a:solidFill>
-            <a:headEnd type="arrow"/>
-            <a:tailEnd type="none"/>
-          </a:ln>
-        </p:spPr>
-        <p:style>
-          <a:lnRef idx="1">
-            <a:schemeClr val="accent1"/>
-          </a:lnRef>
-          <a:fillRef idx="0">
-            <a:schemeClr val="accent1"/>
-          </a:fillRef>
-          <a:effectRef idx="0">
-            <a:schemeClr val="accent1"/>
-          </a:effectRef>
-          <a:fontRef idx="minor">
-            <a:schemeClr val="tx1"/>
-          </a:fontRef>
-        </p:style>
-      </p:cxnSp>
-      <p:sp>
-        <p:nvSpPr>
-          <p:cNvPr id="27" name="Rectangle 26">
-            <a:extLst>
-              <a:ext uri="{FF2B5EF4-FFF2-40B4-BE49-F238E27FC236}">
-                <a16:creationId xmlns:a16="http://schemas.microsoft.com/office/drawing/2014/main" id="{E3A59578-F4B5-2744-842D-32E86C42260F}"/>
-              </a:ext>
-            </a:extLst>
-          </p:cNvPr>
-          <p:cNvSpPr/>
-          <p:nvPr/>
-        </p:nvSpPr>
-        <p:spPr>
-          <a:xfrm>
-            <a:off x="2947313" y="1397233"/>
-            <a:ext cx="6660000" cy="216000"/>
-          </a:xfrm>
-          <a:prstGeom prst="rect">
-            <a:avLst/>
-          </a:prstGeom>
-          <a:solidFill>
-            <a:schemeClr val="bg1"/>
-          </a:solidFill>
-        </p:spPr>
-        <p:style>
-          <a:lnRef idx="2">
-            <a:schemeClr val="accent1">
-              <a:shade val="50000"/>
-            </a:schemeClr>
-          </a:lnRef>
-          <a:fillRef idx="1">
-            <a:schemeClr val="accent1"/>
-          </a:fillRef>
-          <a:effectRef idx="0">
-            <a:schemeClr val="accent1"/>
-          </a:effectRef>
-          <a:fontRef idx="minor">
-            <a:schemeClr val="lt1"/>
-          </a:fontRef>
-        </p:style>
-        <p:txBody>
-          <a:bodyPr rtlCol="0" anchor="ctr"/>
-          <a:lstStyle/>
-          <a:p>
-            <a:r>
-              <a:rPr lang="fr-FR" sz="1600" b="1" dirty="0">
-                <a:solidFill>
-                  <a:schemeClr val="tx1"/>
-                </a:solidFill>
-              </a:rPr>
-              <a:t>/Maxence-</a:t>
-            </a:r>
-            <a:r>
-              <a:rPr lang="fr-FR" sz="1600" b="1" dirty="0" err="1">
-                <a:solidFill>
-                  <a:schemeClr val="tx1"/>
-                </a:solidFill>
-              </a:rPr>
-              <a:t>Macia</a:t>
-            </a:r>
-            <a:r>
-              <a:rPr lang="fr-FR" sz="1600" b="1" dirty="0">
-                <a:solidFill>
-                  <a:schemeClr val="tx1"/>
-                </a:solidFill>
-              </a:rPr>
-              <a:t>/Desktop/About-me</a:t>
-            </a:r>
-          </a:p>
-        </p:txBody>
-      </p:sp>
     </p:spTree>
     <p:extLst>
       <p:ext uri="{BB962C8B-B14F-4D97-AF65-F5344CB8AC3E}">
@@ -4810,6 +5114,769 @@
 </file>
 
 <file path=ppt/slides/slide4.xml><?xml version="1.0" encoding="utf-8"?>
+<p:sld xmlns:a="http://schemas.openxmlformats.org/drawingml/2006/main" xmlns:r="http://schemas.openxmlformats.org/officeDocument/2006/relationships" xmlns:p="http://schemas.openxmlformats.org/presentationml/2006/main">
+  <p:cSld>
+    <p:spTree>
+      <p:nvGrpSpPr>
+        <p:cNvPr id="1" name=""/>
+        <p:cNvGrpSpPr/>
+        <p:nvPr/>
+      </p:nvGrpSpPr>
+      <p:grpSpPr>
+        <a:xfrm>
+          <a:off x="0" y="0"/>
+          <a:ext cx="0" cy="0"/>
+          <a:chOff x="0" y="0"/>
+          <a:chExt cx="0" cy="0"/>
+        </a:xfrm>
+      </p:grpSpPr>
+      <p:grpSp>
+        <p:nvGrpSpPr>
+          <p:cNvPr id="3" name="Groupe 2">
+            <a:extLst>
+              <a:ext uri="{FF2B5EF4-FFF2-40B4-BE49-F238E27FC236}">
+                <a16:creationId xmlns:a16="http://schemas.microsoft.com/office/drawing/2014/main" id="{67986CBD-CC85-7F4D-92BE-6455A2A96D12}"/>
+              </a:ext>
+            </a:extLst>
+          </p:cNvPr>
+          <p:cNvGrpSpPr/>
+          <p:nvPr/>
+        </p:nvGrpSpPr>
+        <p:grpSpPr>
+          <a:xfrm>
+            <a:off x="3781168" y="556055"/>
+            <a:ext cx="3867667" cy="5671751"/>
+            <a:chOff x="3781168" y="556055"/>
+            <a:chExt cx="3867667" cy="5671751"/>
+          </a:xfrm>
+        </p:grpSpPr>
+        <p:sp>
+          <p:nvSpPr>
+            <p:cNvPr id="5" name="Rectangle 4">
+              <a:extLst>
+                <a:ext uri="{FF2B5EF4-FFF2-40B4-BE49-F238E27FC236}">
+                  <a16:creationId xmlns:a16="http://schemas.microsoft.com/office/drawing/2014/main" id="{9943C8EA-7165-D646-8FD0-BEBDEAFB79D1}"/>
+                </a:ext>
+              </a:extLst>
+            </p:cNvPr>
+            <p:cNvSpPr/>
+            <p:nvPr/>
+          </p:nvSpPr>
+          <p:spPr>
+            <a:xfrm>
+              <a:off x="3781169" y="877330"/>
+              <a:ext cx="3867666" cy="5350476"/>
+            </a:xfrm>
+            <a:prstGeom prst="rect">
+              <a:avLst/>
+            </a:prstGeom>
+            <a:solidFill>
+              <a:schemeClr val="bg1"/>
+            </a:solidFill>
+            <a:ln>
+              <a:solidFill>
+                <a:schemeClr val="tx1"/>
+              </a:solidFill>
+            </a:ln>
+          </p:spPr>
+          <p:style>
+            <a:lnRef idx="2">
+              <a:schemeClr val="accent1">
+                <a:shade val="50000"/>
+              </a:schemeClr>
+            </a:lnRef>
+            <a:fillRef idx="1">
+              <a:schemeClr val="accent1"/>
+            </a:fillRef>
+            <a:effectRef idx="0">
+              <a:schemeClr val="accent1"/>
+            </a:effectRef>
+            <a:fontRef idx="minor">
+              <a:schemeClr val="lt1"/>
+            </a:fontRef>
+          </p:style>
+          <p:txBody>
+            <a:bodyPr rtlCol="0" anchor="ctr"/>
+            <a:lstStyle/>
+            <a:p>
+              <a:pPr algn="ctr"/>
+              <a:endParaRPr lang="fr-FR"/>
+            </a:p>
+          </p:txBody>
+        </p:sp>
+        <p:sp>
+          <p:nvSpPr>
+            <p:cNvPr id="6" name="Rectangle 5">
+              <a:extLst>
+                <a:ext uri="{FF2B5EF4-FFF2-40B4-BE49-F238E27FC236}">
+                  <a16:creationId xmlns:a16="http://schemas.microsoft.com/office/drawing/2014/main" id="{F8291CF5-B299-CB4E-AEFE-5DE119774E7B}"/>
+                </a:ext>
+              </a:extLst>
+            </p:cNvPr>
+            <p:cNvSpPr/>
+            <p:nvPr/>
+          </p:nvSpPr>
+          <p:spPr>
+            <a:xfrm>
+              <a:off x="3781168" y="556055"/>
+              <a:ext cx="3867665" cy="321275"/>
+            </a:xfrm>
+            <a:prstGeom prst="rect">
+              <a:avLst/>
+            </a:prstGeom>
+            <a:solidFill>
+              <a:srgbClr val="00B0F0"/>
+            </a:solidFill>
+            <a:ln>
+              <a:solidFill>
+                <a:schemeClr val="tx1"/>
+              </a:solidFill>
+            </a:ln>
+          </p:spPr>
+          <p:style>
+            <a:lnRef idx="2">
+              <a:schemeClr val="accent1">
+                <a:shade val="50000"/>
+              </a:schemeClr>
+            </a:lnRef>
+            <a:fillRef idx="1">
+              <a:schemeClr val="accent1"/>
+            </a:fillRef>
+            <a:effectRef idx="0">
+              <a:schemeClr val="accent1"/>
+            </a:effectRef>
+            <a:fontRef idx="minor">
+              <a:schemeClr val="lt1"/>
+            </a:fontRef>
+          </p:style>
+          <p:txBody>
+            <a:bodyPr rtlCol="0" anchor="ctr"/>
+            <a:lstStyle/>
+            <a:p>
+              <a:pPr algn="ctr"/>
+              <a:endParaRPr lang="fr-FR"/>
+            </a:p>
+          </p:txBody>
+        </p:sp>
+        <p:sp>
+          <p:nvSpPr>
+            <p:cNvPr id="7" name="Rectangle 6">
+              <a:extLst>
+                <a:ext uri="{FF2B5EF4-FFF2-40B4-BE49-F238E27FC236}">
+                  <a16:creationId xmlns:a16="http://schemas.microsoft.com/office/drawing/2014/main" id="{D5D66263-C391-6D48-B014-1E804599A45E}"/>
+                </a:ext>
+              </a:extLst>
+            </p:cNvPr>
+            <p:cNvSpPr/>
+            <p:nvPr/>
+          </p:nvSpPr>
+          <p:spPr>
+            <a:xfrm>
+              <a:off x="3855307" y="617838"/>
+              <a:ext cx="197708" cy="197708"/>
+            </a:xfrm>
+            <a:prstGeom prst="rect">
+              <a:avLst/>
+            </a:prstGeom>
+            <a:solidFill>
+              <a:schemeClr val="bg2"/>
+            </a:solidFill>
+            <a:ln>
+              <a:solidFill>
+                <a:schemeClr val="tx1"/>
+              </a:solidFill>
+            </a:ln>
+          </p:spPr>
+          <p:style>
+            <a:lnRef idx="2">
+              <a:schemeClr val="accent1">
+                <a:shade val="50000"/>
+              </a:schemeClr>
+            </a:lnRef>
+            <a:fillRef idx="1">
+              <a:schemeClr val="accent1"/>
+            </a:fillRef>
+            <a:effectRef idx="0">
+              <a:schemeClr val="accent1"/>
+            </a:effectRef>
+            <a:fontRef idx="minor">
+              <a:schemeClr val="lt1"/>
+            </a:fontRef>
+          </p:style>
+          <p:txBody>
+            <a:bodyPr rtlCol="0" anchor="ctr"/>
+            <a:lstStyle/>
+            <a:p>
+              <a:pPr algn="ctr"/>
+              <a:endParaRPr lang="fr-FR"/>
+            </a:p>
+          </p:txBody>
+        </p:sp>
+        <p:sp>
+          <p:nvSpPr>
+            <p:cNvPr id="8" name="Rectangle 7">
+              <a:extLst>
+                <a:ext uri="{FF2B5EF4-FFF2-40B4-BE49-F238E27FC236}">
+                  <a16:creationId xmlns:a16="http://schemas.microsoft.com/office/drawing/2014/main" id="{591B4BF7-00F3-2C4F-A38D-1A486CF881CD}"/>
+                </a:ext>
+              </a:extLst>
+            </p:cNvPr>
+            <p:cNvSpPr/>
+            <p:nvPr/>
+          </p:nvSpPr>
+          <p:spPr>
+            <a:xfrm>
+              <a:off x="4151864" y="617838"/>
+              <a:ext cx="197708" cy="197708"/>
+            </a:xfrm>
+            <a:prstGeom prst="rect">
+              <a:avLst/>
+            </a:prstGeom>
+            <a:solidFill>
+              <a:schemeClr val="bg2"/>
+            </a:solidFill>
+            <a:ln>
+              <a:solidFill>
+                <a:schemeClr val="tx1"/>
+              </a:solidFill>
+            </a:ln>
+          </p:spPr>
+          <p:style>
+            <a:lnRef idx="2">
+              <a:schemeClr val="accent1">
+                <a:shade val="50000"/>
+              </a:schemeClr>
+            </a:lnRef>
+            <a:fillRef idx="1">
+              <a:schemeClr val="accent1"/>
+            </a:fillRef>
+            <a:effectRef idx="0">
+              <a:schemeClr val="accent1"/>
+            </a:effectRef>
+            <a:fontRef idx="minor">
+              <a:schemeClr val="lt1"/>
+            </a:fontRef>
+          </p:style>
+          <p:txBody>
+            <a:bodyPr rtlCol="0" anchor="ctr"/>
+            <a:lstStyle/>
+            <a:p>
+              <a:pPr algn="ctr"/>
+              <a:endParaRPr lang="fr-FR"/>
+            </a:p>
+          </p:txBody>
+        </p:sp>
+        <p:sp>
+          <p:nvSpPr>
+            <p:cNvPr id="9" name="Rectangle 8">
+              <a:extLst>
+                <a:ext uri="{FF2B5EF4-FFF2-40B4-BE49-F238E27FC236}">
+                  <a16:creationId xmlns:a16="http://schemas.microsoft.com/office/drawing/2014/main" id="{E14F15B3-2799-8740-B106-23B7AABDF345}"/>
+                </a:ext>
+              </a:extLst>
+            </p:cNvPr>
+            <p:cNvSpPr/>
+            <p:nvPr/>
+          </p:nvSpPr>
+          <p:spPr>
+            <a:xfrm>
+              <a:off x="4448421" y="617838"/>
+              <a:ext cx="197708" cy="197708"/>
+            </a:xfrm>
+            <a:prstGeom prst="rect">
+              <a:avLst/>
+            </a:prstGeom>
+            <a:solidFill>
+              <a:schemeClr val="bg2"/>
+            </a:solidFill>
+            <a:ln>
+              <a:solidFill>
+                <a:schemeClr val="tx1"/>
+              </a:solidFill>
+            </a:ln>
+          </p:spPr>
+          <p:style>
+            <a:lnRef idx="2">
+              <a:schemeClr val="accent1">
+                <a:shade val="50000"/>
+              </a:schemeClr>
+            </a:lnRef>
+            <a:fillRef idx="1">
+              <a:schemeClr val="accent1"/>
+            </a:fillRef>
+            <a:effectRef idx="0">
+              <a:schemeClr val="accent1"/>
+            </a:effectRef>
+            <a:fontRef idx="minor">
+              <a:schemeClr val="lt1"/>
+            </a:fontRef>
+          </p:style>
+          <p:txBody>
+            <a:bodyPr rtlCol="0" anchor="ctr"/>
+            <a:lstStyle/>
+            <a:p>
+              <a:pPr algn="ctr"/>
+              <a:endParaRPr lang="fr-FR"/>
+            </a:p>
+          </p:txBody>
+        </p:sp>
+        <p:grpSp>
+          <p:nvGrpSpPr>
+            <p:cNvPr id="18" name="Groupe 17">
+              <a:extLst>
+                <a:ext uri="{FF2B5EF4-FFF2-40B4-BE49-F238E27FC236}">
+                  <a16:creationId xmlns:a16="http://schemas.microsoft.com/office/drawing/2014/main" id="{6D155C88-EB9E-9340-B6E5-D8CD37AF5C66}"/>
+                </a:ext>
+              </a:extLst>
+            </p:cNvPr>
+            <p:cNvGrpSpPr>
+              <a:grpSpLocks noChangeAspect="1"/>
+            </p:cNvGrpSpPr>
+            <p:nvPr/>
+          </p:nvGrpSpPr>
+          <p:grpSpPr>
+            <a:xfrm>
+              <a:off x="3881094" y="659486"/>
+              <a:ext cx="144000" cy="136423"/>
+              <a:chOff x="10725665" y="3175686"/>
+              <a:chExt cx="704335" cy="667265"/>
+            </a:xfrm>
+          </p:grpSpPr>
+          <p:cxnSp>
+            <p:nvCxnSpPr>
+              <p:cNvPr id="11" name="Connecteur droit 10">
+                <a:extLst>
+                  <a:ext uri="{FF2B5EF4-FFF2-40B4-BE49-F238E27FC236}">
+                    <a16:creationId xmlns:a16="http://schemas.microsoft.com/office/drawing/2014/main" id="{FA46467D-3455-904C-9716-8C86570F3486}"/>
+                  </a:ext>
+                </a:extLst>
+              </p:cNvPr>
+              <p:cNvCxnSpPr/>
+              <p:nvPr/>
+            </p:nvCxnSpPr>
+            <p:spPr>
+              <a:xfrm>
+                <a:off x="10725665" y="3175686"/>
+                <a:ext cx="704335" cy="667265"/>
+              </a:xfrm>
+              <a:prstGeom prst="line">
+                <a:avLst/>
+              </a:prstGeom>
+              <a:ln>
+                <a:solidFill>
+                  <a:schemeClr val="tx1"/>
+                </a:solidFill>
+              </a:ln>
+            </p:spPr>
+            <p:style>
+              <a:lnRef idx="1">
+                <a:schemeClr val="accent1"/>
+              </a:lnRef>
+              <a:fillRef idx="0">
+                <a:schemeClr val="accent1"/>
+              </a:fillRef>
+              <a:effectRef idx="0">
+                <a:schemeClr val="accent1"/>
+              </a:effectRef>
+              <a:fontRef idx="minor">
+                <a:schemeClr val="tx1"/>
+              </a:fontRef>
+            </p:style>
+          </p:cxnSp>
+          <p:cxnSp>
+            <p:nvCxnSpPr>
+              <p:cNvPr id="16" name="Connecteur droit 15">
+                <a:extLst>
+                  <a:ext uri="{FF2B5EF4-FFF2-40B4-BE49-F238E27FC236}">
+                    <a16:creationId xmlns:a16="http://schemas.microsoft.com/office/drawing/2014/main" id="{E5E8E65C-CF2B-C442-98AF-4A66C330A88D}"/>
+                  </a:ext>
+                </a:extLst>
+              </p:cNvPr>
+              <p:cNvCxnSpPr/>
+              <p:nvPr/>
+            </p:nvCxnSpPr>
+            <p:spPr>
+              <a:xfrm flipH="1">
+                <a:off x="10725665" y="3175686"/>
+                <a:ext cx="704335" cy="667265"/>
+              </a:xfrm>
+              <a:prstGeom prst="line">
+                <a:avLst/>
+              </a:prstGeom>
+              <a:ln>
+                <a:solidFill>
+                  <a:schemeClr val="tx1"/>
+                </a:solidFill>
+              </a:ln>
+            </p:spPr>
+            <p:style>
+              <a:lnRef idx="1">
+                <a:schemeClr val="accent1"/>
+              </a:lnRef>
+              <a:fillRef idx="0">
+                <a:schemeClr val="accent1"/>
+              </a:fillRef>
+              <a:effectRef idx="0">
+                <a:schemeClr val="accent1"/>
+              </a:effectRef>
+              <a:fontRef idx="minor">
+                <a:schemeClr val="tx1"/>
+              </a:fontRef>
+            </p:style>
+          </p:cxnSp>
+        </p:grpSp>
+        <p:sp>
+          <p:nvSpPr>
+            <p:cNvPr id="19" name="Rectangle 18">
+              <a:extLst>
+                <a:ext uri="{FF2B5EF4-FFF2-40B4-BE49-F238E27FC236}">
+                  <a16:creationId xmlns:a16="http://schemas.microsoft.com/office/drawing/2014/main" id="{BE6DABA1-2E52-6340-A704-2620005F3212}"/>
+                </a:ext>
+              </a:extLst>
+            </p:cNvPr>
+            <p:cNvSpPr/>
+            <p:nvPr/>
+          </p:nvSpPr>
+          <p:spPr>
+            <a:xfrm>
+              <a:off x="4188927" y="654913"/>
+              <a:ext cx="123568" cy="111210"/>
+            </a:xfrm>
+            <a:prstGeom prst="rect">
+              <a:avLst/>
+            </a:prstGeom>
+            <a:noFill/>
+            <a:ln>
+              <a:solidFill>
+                <a:schemeClr val="tx1"/>
+              </a:solidFill>
+            </a:ln>
+          </p:spPr>
+          <p:style>
+            <a:lnRef idx="2">
+              <a:schemeClr val="accent1">
+                <a:shade val="50000"/>
+              </a:schemeClr>
+            </a:lnRef>
+            <a:fillRef idx="1">
+              <a:schemeClr val="accent1"/>
+            </a:fillRef>
+            <a:effectRef idx="0">
+              <a:schemeClr val="accent1"/>
+            </a:effectRef>
+            <a:fontRef idx="minor">
+              <a:schemeClr val="lt1"/>
+            </a:fontRef>
+          </p:style>
+          <p:txBody>
+            <a:bodyPr rtlCol="0" anchor="ctr"/>
+            <a:lstStyle/>
+            <a:p>
+              <a:pPr algn="ctr"/>
+              <a:endParaRPr lang="fr-FR"/>
+            </a:p>
+          </p:txBody>
+        </p:sp>
+        <p:cxnSp>
+          <p:nvCxnSpPr>
+            <p:cNvPr id="21" name="Connecteur droit 20">
+              <a:extLst>
+                <a:ext uri="{FF2B5EF4-FFF2-40B4-BE49-F238E27FC236}">
+                  <a16:creationId xmlns:a16="http://schemas.microsoft.com/office/drawing/2014/main" id="{35957505-EC89-484E-8252-FEF75A0DD2C8}"/>
+                </a:ext>
+              </a:extLst>
+            </p:cNvPr>
+            <p:cNvCxnSpPr/>
+            <p:nvPr/>
+          </p:nvCxnSpPr>
+          <p:spPr>
+            <a:xfrm>
+              <a:off x="4473138" y="741412"/>
+              <a:ext cx="144000" cy="0"/>
+            </a:xfrm>
+            <a:prstGeom prst="line">
+              <a:avLst/>
+            </a:prstGeom>
+            <a:ln>
+              <a:solidFill>
+                <a:schemeClr val="tx1"/>
+              </a:solidFill>
+            </a:ln>
+          </p:spPr>
+          <p:style>
+            <a:lnRef idx="1">
+              <a:schemeClr val="accent1"/>
+            </a:lnRef>
+            <a:fillRef idx="0">
+              <a:schemeClr val="accent1"/>
+            </a:fillRef>
+            <a:effectRef idx="0">
+              <a:schemeClr val="accent1"/>
+            </a:effectRef>
+            <a:fontRef idx="minor">
+              <a:schemeClr val="tx1"/>
+            </a:fontRef>
+          </p:style>
+        </p:cxnSp>
+        <p:sp>
+          <p:nvSpPr>
+            <p:cNvPr id="30" name="Rectangle 29">
+              <a:extLst>
+                <a:ext uri="{FF2B5EF4-FFF2-40B4-BE49-F238E27FC236}">
+                  <a16:creationId xmlns:a16="http://schemas.microsoft.com/office/drawing/2014/main" id="{08335D03-B13B-C14D-8F75-CB7A1CFE38AB}"/>
+                </a:ext>
+              </a:extLst>
+            </p:cNvPr>
+            <p:cNvSpPr/>
+            <p:nvPr/>
+          </p:nvSpPr>
+          <p:spPr>
+            <a:xfrm>
+              <a:off x="3781168" y="556055"/>
+              <a:ext cx="3867665" cy="5671751"/>
+            </a:xfrm>
+            <a:prstGeom prst="rect">
+              <a:avLst/>
+            </a:prstGeom>
+            <a:noFill/>
+            <a:ln w="25400">
+              <a:solidFill>
+                <a:schemeClr val="tx1"/>
+              </a:solidFill>
+            </a:ln>
+          </p:spPr>
+          <p:style>
+            <a:lnRef idx="2">
+              <a:schemeClr val="accent1">
+                <a:shade val="50000"/>
+              </a:schemeClr>
+            </a:lnRef>
+            <a:fillRef idx="1">
+              <a:schemeClr val="accent1"/>
+            </a:fillRef>
+            <a:effectRef idx="0">
+              <a:schemeClr val="accent1"/>
+            </a:effectRef>
+            <a:fontRef idx="minor">
+              <a:schemeClr val="lt1"/>
+            </a:fontRef>
+          </p:style>
+          <p:txBody>
+            <a:bodyPr rtlCol="0" anchor="ctr"/>
+            <a:lstStyle/>
+            <a:p>
+              <a:pPr algn="ctr"/>
+              <a:endParaRPr lang="fr-FR"/>
+            </a:p>
+          </p:txBody>
+        </p:sp>
+        <p:grpSp>
+          <p:nvGrpSpPr>
+            <p:cNvPr id="20" name="Groupe 19">
+              <a:extLst>
+                <a:ext uri="{FF2B5EF4-FFF2-40B4-BE49-F238E27FC236}">
+                  <a16:creationId xmlns:a16="http://schemas.microsoft.com/office/drawing/2014/main" id="{101ABDB5-241F-2E43-B87C-B39AA1904069}"/>
+                </a:ext>
+              </a:extLst>
+            </p:cNvPr>
+            <p:cNvGrpSpPr>
+              <a:grpSpLocks noChangeAspect="1"/>
+            </p:cNvGrpSpPr>
+            <p:nvPr/>
+          </p:nvGrpSpPr>
+          <p:grpSpPr>
+            <a:xfrm>
+              <a:off x="7286557" y="601453"/>
+              <a:ext cx="322524" cy="217163"/>
+              <a:chOff x="6841983" y="1453356"/>
+              <a:chExt cx="4741829" cy="3192785"/>
+            </a:xfrm>
+          </p:grpSpPr>
+          <p:sp>
+            <p:nvSpPr>
+              <p:cNvPr id="23" name="Rectangle 22">
+                <a:extLst>
+                  <a:ext uri="{FF2B5EF4-FFF2-40B4-BE49-F238E27FC236}">
+                    <a16:creationId xmlns:a16="http://schemas.microsoft.com/office/drawing/2014/main" id="{AFADB836-47D6-744A-B89F-5418974DB829}"/>
+                  </a:ext>
+                </a:extLst>
+              </p:cNvPr>
+              <p:cNvSpPr/>
+              <p:nvPr/>
+            </p:nvSpPr>
+            <p:spPr>
+              <a:xfrm>
+                <a:off x="8505568" y="1635209"/>
+                <a:ext cx="1964724" cy="2829698"/>
+              </a:xfrm>
+              <a:prstGeom prst="rect">
+                <a:avLst/>
+              </a:prstGeom>
+              <a:solidFill>
+                <a:schemeClr val="bg1"/>
+              </a:solidFill>
+              <a:ln w="25400">
+                <a:solidFill>
+                  <a:schemeClr val="tx1"/>
+                </a:solidFill>
+              </a:ln>
+            </p:spPr>
+            <p:style>
+              <a:lnRef idx="2">
+                <a:schemeClr val="accent1">
+                  <a:shade val="50000"/>
+                </a:schemeClr>
+              </a:lnRef>
+              <a:fillRef idx="1">
+                <a:schemeClr val="accent1"/>
+              </a:fillRef>
+              <a:effectRef idx="0">
+                <a:schemeClr val="accent1"/>
+              </a:effectRef>
+              <a:fontRef idx="minor">
+                <a:schemeClr val="lt1"/>
+              </a:fontRef>
+            </p:style>
+            <p:txBody>
+              <a:bodyPr rtlCol="0" anchor="ctr"/>
+              <a:lstStyle/>
+              <a:p>
+                <a:pPr algn="ctr"/>
+                <a:endParaRPr lang="fr-FR" dirty="0"/>
+              </a:p>
+            </p:txBody>
+          </p:sp>
+          <p:grpSp>
+            <p:nvGrpSpPr>
+              <p:cNvPr id="25" name="Groupe 24">
+                <a:extLst>
+                  <a:ext uri="{FF2B5EF4-FFF2-40B4-BE49-F238E27FC236}">
+                    <a16:creationId xmlns:a16="http://schemas.microsoft.com/office/drawing/2014/main" id="{083002EF-6DB8-014E-8206-92F3BB0D5C2D}"/>
+                  </a:ext>
+                </a:extLst>
+              </p:cNvPr>
+              <p:cNvGrpSpPr/>
+              <p:nvPr/>
+            </p:nvGrpSpPr>
+            <p:grpSpPr>
+              <a:xfrm>
+                <a:off x="6841983" y="1453356"/>
+                <a:ext cx="4741829" cy="3192785"/>
+                <a:chOff x="6841983" y="1453356"/>
+                <a:chExt cx="4741829" cy="3192785"/>
+              </a:xfrm>
+            </p:grpSpPr>
+            <p:sp>
+              <p:nvSpPr>
+                <p:cNvPr id="28" name="Rectangle 27">
+                  <a:extLst>
+                    <a:ext uri="{FF2B5EF4-FFF2-40B4-BE49-F238E27FC236}">
+                      <a16:creationId xmlns:a16="http://schemas.microsoft.com/office/drawing/2014/main" id="{3266B127-D259-D645-BAF1-6B3F1EB5F208}"/>
+                    </a:ext>
+                  </a:extLst>
+                </p:cNvPr>
+                <p:cNvSpPr/>
+                <p:nvPr/>
+              </p:nvSpPr>
+              <p:spPr>
+                <a:xfrm>
+                  <a:off x="8353168" y="1816443"/>
+                  <a:ext cx="1964724" cy="2829698"/>
+                </a:xfrm>
+                <a:prstGeom prst="rect">
+                  <a:avLst/>
+                </a:prstGeom>
+                <a:solidFill>
+                  <a:schemeClr val="bg1"/>
+                </a:solidFill>
+                <a:ln w="25400">
+                  <a:solidFill>
+                    <a:schemeClr val="tx1"/>
+                  </a:solidFill>
+                </a:ln>
+              </p:spPr>
+              <p:style>
+                <a:lnRef idx="2">
+                  <a:schemeClr val="accent1">
+                    <a:shade val="50000"/>
+                  </a:schemeClr>
+                </a:lnRef>
+                <a:fillRef idx="1">
+                  <a:schemeClr val="accent1"/>
+                </a:fillRef>
+                <a:effectRef idx="0">
+                  <a:schemeClr val="accent1"/>
+                </a:effectRef>
+                <a:fontRef idx="minor">
+                  <a:schemeClr val="lt1"/>
+                </a:fontRef>
+              </p:style>
+              <p:txBody>
+                <a:bodyPr rtlCol="0" anchor="ctr"/>
+                <a:lstStyle/>
+                <a:p>
+                  <a:pPr algn="ctr"/>
+                  <a:endParaRPr lang="fr-FR" dirty="0"/>
+                </a:p>
+              </p:txBody>
+            </p:sp>
+            <p:sp>
+              <p:nvSpPr>
+                <p:cNvPr id="29" name="ZoneTexte 28">
+                  <a:extLst>
+                    <a:ext uri="{FF2B5EF4-FFF2-40B4-BE49-F238E27FC236}">
+                      <a16:creationId xmlns:a16="http://schemas.microsoft.com/office/drawing/2014/main" id="{E3D91BA1-BEFE-AE40-9184-CB9F733A04B9}"/>
+                    </a:ext>
+                  </a:extLst>
+                </p:cNvPr>
+                <p:cNvSpPr txBox="1"/>
+                <p:nvPr/>
+              </p:nvSpPr>
+              <p:spPr>
+                <a:xfrm>
+                  <a:off x="6841983" y="1453356"/>
+                  <a:ext cx="4741829" cy="3167512"/>
+                </a:xfrm>
+                <a:prstGeom prst="rect">
+                  <a:avLst/>
+                </a:prstGeom>
+                <a:noFill/>
+              </p:spPr>
+              <p:txBody>
+                <a:bodyPr wrap="none" rtlCol="0">
+                  <a:spAutoFit/>
+                </a:bodyPr>
+                <a:lstStyle/>
+                <a:p>
+                  <a:r>
+                    <a:rPr lang="fr-FR" sz="800" dirty="0"/>
+                    <a:t>.</a:t>
+                  </a:r>
+                  <a:r>
+                    <a:rPr lang="fr-FR" sz="800" dirty="0" err="1"/>
+                    <a:t>txt</a:t>
+                  </a:r>
+                  <a:endParaRPr lang="fr-FR" sz="800" dirty="0"/>
+                </a:p>
+              </p:txBody>
+            </p:sp>
+          </p:grpSp>
+        </p:grpSp>
+      </p:grpSp>
+    </p:spTree>
+    <p:extLst>
+      <p:ext uri="{BB962C8B-B14F-4D97-AF65-F5344CB8AC3E}">
+        <p14:creationId xmlns:p14="http://schemas.microsoft.com/office/powerpoint/2010/main" val="296174599"/>
+      </p:ext>
+    </p:extLst>
+  </p:cSld>
+  <p:clrMapOvr>
+    <a:masterClrMapping/>
+  </p:clrMapOvr>
+</p:sld>
+</file>
+
+<file path=ppt/slides/slide5.xml><?xml version="1.0" encoding="utf-8"?>
 <p:sld xmlns:a="http://schemas.openxmlformats.org/drawingml/2006/main" xmlns:r="http://schemas.openxmlformats.org/officeDocument/2006/relationships" xmlns:p="http://schemas.openxmlformats.org/presentationml/2006/main">
   <p:cSld>
     <p:spTree>
@@ -8383,7 +9450,7 @@
 </p:sld>
 </file>
 
-<file path=ppt/slides/slide5.xml><?xml version="1.0" encoding="utf-8"?>
+<file path=ppt/slides/slide6.xml><?xml version="1.0" encoding="utf-8"?>
 <p:sld xmlns:a="http://schemas.openxmlformats.org/drawingml/2006/main" xmlns:r="http://schemas.openxmlformats.org/officeDocument/2006/relationships" xmlns:p="http://schemas.openxmlformats.org/presentationml/2006/main">
   <p:cSld>
     <p:spTree>

</xml_diff>